<commit_message>
Very WIP FringeUI Module
VBA Module for adding custom buttons to the application ribbon
</commit_message>
<xml_diff>
--- a/Tools Testing/PPTLinking 4-6-2025.pptx
+++ b/Tools Testing/PPTLinking 4-6-2025.pptx
@@ -123,8 +123,7 @@
 <file path=ppt/revisionInfo.xml><?xml version="1.0" encoding="utf-8"?>
 <p1510:revInfo xmlns:a="http://schemas.openxmlformats.org/drawingml/2006/main" xmlns:r="http://schemas.openxmlformats.org/officeDocument/2006/relationships" xmlns:p1510="http://schemas.microsoft.com/office/powerpoint/2015/10/main">
   <p1510:revLst>
-    <p1510:client id="{628F5A35-D314-417A-8C0A-E6DD477D7985}" v="78" dt="2025-04-06T15:23:01.081"/>
-    <p1510:client id="{9BD32EDE-1DDF-4D8E-8501-4526359878AB}" v="35" dt="2025-04-05T18:06:53.242"/>
+    <p1510:client id="{628F5A35-D314-417A-8C0A-E6DD477D7985}" v="156" dt="2025-04-06T23:26:30.593"/>
   </p1510:revLst>
 </p1510:revInfo>
 </file>
@@ -134,16 +133,24 @@
   <pc:docChgLst>
     <pc:chgData name="Ash Stek" userId="0c591091f072a45f" providerId="LiveId" clId="{628F5A35-D314-417A-8C0A-E6DD477D7985}"/>
     <pc:docChg chg="custSel modSld">
-      <pc:chgData name="Ash Stek" userId="0c591091f072a45f" providerId="LiveId" clId="{628F5A35-D314-417A-8C0A-E6DD477D7985}" dt="2025-04-06T15:23:01.081" v="110"/>
+      <pc:chgData name="Ash Stek" userId="0c591091f072a45f" providerId="LiveId" clId="{628F5A35-D314-417A-8C0A-E6DD477D7985}" dt="2025-04-06T23:26:30.593" v="214"/>
       <pc:docMkLst>
         <pc:docMk/>
       </pc:docMkLst>
       <pc:sldChg chg="addSp delSp modSp mod">
-        <pc:chgData name="Ash Stek" userId="0c591091f072a45f" providerId="LiveId" clId="{628F5A35-D314-417A-8C0A-E6DD477D7985}" dt="2025-04-06T15:23:01.009" v="106"/>
+        <pc:chgData name="Ash Stek" userId="0c591091f072a45f" providerId="LiveId" clId="{628F5A35-D314-417A-8C0A-E6DD477D7985}" dt="2025-04-06T23:26:30.381" v="210"/>
         <pc:sldMkLst>
           <pc:docMk/>
           <pc:sldMk cId="695944709" sldId="256"/>
         </pc:sldMkLst>
+        <pc:picChg chg="add del mod">
+          <ac:chgData name="Ash Stek" userId="0c591091f072a45f" providerId="LiveId" clId="{628F5A35-D314-417A-8C0A-E6DD477D7985}" dt="2025-04-06T23:26:30.169" v="204"/>
+          <ac:picMkLst>
+            <pc:docMk/>
+            <pc:sldMk cId="695944709" sldId="256"/>
+            <ac:picMk id="2" creationId="{005F6196-D689-86B3-16B8-4DF309743752}"/>
+          </ac:picMkLst>
+        </pc:picChg>
         <pc:picChg chg="add del mod">
           <ac:chgData name="Ash Stek" userId="0c591091f072a45f" providerId="LiveId" clId="{628F5A35-D314-417A-8C0A-E6DD477D7985}" dt="2025-04-06T15:22:48.721" v="88"/>
           <ac:picMkLst>
@@ -161,6 +168,14 @@
           </ac:picMkLst>
         </pc:picChg>
         <pc:picChg chg="add del mod">
+          <ac:chgData name="Ash Stek" userId="0c591091f072a45f" providerId="LiveId" clId="{628F5A35-D314-417A-8C0A-E6DD477D7985}" dt="2025-04-06T23:24:59.903" v="184"/>
+          <ac:picMkLst>
+            <pc:docMk/>
+            <pc:sldMk cId="695944709" sldId="256"/>
+            <ac:picMk id="2" creationId="{7146D538-1F76-1A64-4CC3-86F2A147C9B4}"/>
+          </ac:picMkLst>
+        </pc:picChg>
+        <pc:picChg chg="add del mod">
           <ac:chgData name="Ash Stek" userId="0c591091f072a45f" providerId="LiveId" clId="{628F5A35-D314-417A-8C0A-E6DD477D7985}" dt="2025-04-06T04:14:08.184" v="7"/>
           <ac:picMkLst>
             <pc:docMk/>
@@ -169,11 +184,43 @@
           </ac:picMkLst>
         </pc:picChg>
         <pc:picChg chg="add del mod">
+          <ac:chgData name="Ash Stek" userId="0c591091f072a45f" providerId="LiveId" clId="{628F5A35-D314-417A-8C0A-E6DD477D7985}" dt="2025-04-06T22:24:21.530" v="124"/>
+          <ac:picMkLst>
+            <pc:docMk/>
+            <pc:sldMk cId="695944709" sldId="256"/>
+            <ac:picMk id="2" creationId="{D580C7F1-A3EF-7D5B-C3A0-BFD804D27302}"/>
+          </ac:picMkLst>
+        </pc:picChg>
+        <pc:picChg chg="add del mod">
           <ac:chgData name="Ash Stek" userId="0c591091f072a45f" providerId="LiveId" clId="{628F5A35-D314-417A-8C0A-E6DD477D7985}" dt="2025-04-06T04:31:51.792" v="19"/>
           <ac:picMkLst>
             <pc:docMk/>
             <pc:sldMk cId="695944709" sldId="256"/>
             <ac:picMk id="3" creationId="{55F86ED4-21A4-9DCB-2FBB-42AFAF26D528}"/>
+          </ac:picMkLst>
+        </pc:picChg>
+        <pc:picChg chg="add del mod">
+          <ac:chgData name="Ash Stek" userId="0c591091f072a45f" providerId="LiveId" clId="{628F5A35-D314-417A-8C0A-E6DD477D7985}" dt="2025-04-06T23:25:48.141" v="194"/>
+          <ac:picMkLst>
+            <pc:docMk/>
+            <pc:sldMk cId="695944709" sldId="256"/>
+            <ac:picMk id="3" creationId="{60FF521B-EB46-E691-56CD-D6CE05AC4736}"/>
+          </ac:picMkLst>
+        </pc:picChg>
+        <pc:picChg chg="add del mod">
+          <ac:chgData name="Ash Stek" userId="0c591091f072a45f" providerId="LiveId" clId="{628F5A35-D314-417A-8C0A-E6DD477D7985}" dt="2025-04-06T22:24:34.170" v="136"/>
+          <ac:picMkLst>
+            <pc:docMk/>
+            <pc:sldMk cId="695944709" sldId="256"/>
+            <ac:picMk id="3" creationId="{BECA3400-055D-4221-5F54-04FB06E28FF5}"/>
+          </ac:picMkLst>
+        </pc:picChg>
+        <pc:picChg chg="add mod">
+          <ac:chgData name="Ash Stek" userId="0c591091f072a45f" providerId="LiveId" clId="{628F5A35-D314-417A-8C0A-E6DD477D7985}" dt="2025-04-06T23:26:30.381" v="210"/>
+          <ac:picMkLst>
+            <pc:docMk/>
+            <pc:sldMk cId="695944709" sldId="256"/>
+            <ac:picMk id="3" creationId="{D4A9120E-DDDE-FC9A-40C0-B889788C255C}"/>
           </ac:picMkLst>
         </pc:picChg>
         <pc:picChg chg="add del mod">
@@ -200,8 +247,16 @@
             <ac:picMk id="4" creationId="{97F9081E-E089-18D9-483B-24C7E5308E49}"/>
           </ac:picMkLst>
         </pc:picChg>
-        <pc:picChg chg="add mod">
-          <ac:chgData name="Ash Stek" userId="0c591091f072a45f" providerId="LiveId" clId="{628F5A35-D314-417A-8C0A-E6DD477D7985}" dt="2025-04-06T15:23:01.009" v="106"/>
+        <pc:picChg chg="add del mod">
+          <ac:chgData name="Ash Stek" userId="0c591091f072a45f" providerId="LiveId" clId="{628F5A35-D314-417A-8C0A-E6DD477D7985}" dt="2025-04-06T22:26:07.802" v="148"/>
+          <ac:picMkLst>
+            <pc:docMk/>
+            <pc:sldMk cId="695944709" sldId="256"/>
+            <ac:picMk id="4" creationId="{D381D87E-16F9-E7D9-A108-3768E24CDA2E}"/>
+          </ac:picMkLst>
+        </pc:picChg>
+        <pc:picChg chg="add del mod">
+          <ac:chgData name="Ash Stek" userId="0c591091f072a45f" providerId="LiveId" clId="{628F5A35-D314-417A-8C0A-E6DD477D7985}" dt="2025-04-06T22:24:07.841" v="112"/>
           <ac:picMkLst>
             <pc:docMk/>
             <pc:sldMk cId="695944709" sldId="256"/>
@@ -224,13 +279,53 @@
             <ac:picMk id="7" creationId="{372CA630-834D-0804-698B-FA5A2BAA4B1B}"/>
           </ac:picMkLst>
         </pc:picChg>
+        <pc:picChg chg="add del mod">
+          <ac:chgData name="Ash Stek" userId="0c591091f072a45f" providerId="LiveId" clId="{628F5A35-D314-417A-8C0A-E6DD477D7985}" dt="2025-04-06T22:26:14.577" v="160"/>
+          <ac:picMkLst>
+            <pc:docMk/>
+            <pc:sldMk cId="695944709" sldId="256"/>
+            <ac:picMk id="7" creationId="{AF82993B-D5E8-6EBA-89BE-664735E1B20F}"/>
+          </ac:picMkLst>
+        </pc:picChg>
+        <pc:picChg chg="add del mod">
+          <ac:chgData name="Ash Stek" userId="0c591091f072a45f" providerId="LiveId" clId="{628F5A35-D314-417A-8C0A-E6DD477D7985}" dt="2025-04-06T23:23:43.926" v="172"/>
+          <ac:picMkLst>
+            <pc:docMk/>
+            <pc:sldMk cId="695944709" sldId="256"/>
+            <ac:picMk id="8" creationId="{D613DC01-C1FA-B612-F5F2-86D7740734F1}"/>
+          </ac:picMkLst>
+        </pc:picChg>
       </pc:sldChg>
       <pc:sldChg chg="addSp delSp modSp mod">
-        <pc:chgData name="Ash Stek" userId="0c591091f072a45f" providerId="LiveId" clId="{628F5A35-D314-417A-8C0A-E6DD477D7985}" dt="2025-04-06T15:23:01.046" v="108"/>
+        <pc:chgData name="Ash Stek" userId="0c591091f072a45f" providerId="LiveId" clId="{628F5A35-D314-417A-8C0A-E6DD477D7985}" dt="2025-04-06T23:26:30.517" v="212"/>
         <pc:sldMkLst>
           <pc:docMk/>
           <pc:sldMk cId="1703094016" sldId="257"/>
         </pc:sldMkLst>
+        <pc:picChg chg="add del mod">
+          <ac:chgData name="Ash Stek" userId="0c591091f072a45f" providerId="LiveId" clId="{628F5A35-D314-417A-8C0A-E6DD477D7985}" dt="2025-04-06T22:24:21.570" v="126"/>
+          <ac:picMkLst>
+            <pc:docMk/>
+            <pc:sldMk cId="1703094016" sldId="257"/>
+            <ac:picMk id="2" creationId="{1B295436-3FC3-9649-0FD3-4796C8A13A07}"/>
+          </ac:picMkLst>
+        </pc:picChg>
+        <pc:picChg chg="add del mod">
+          <ac:chgData name="Ash Stek" userId="0c591091f072a45f" providerId="LiveId" clId="{628F5A35-D314-417A-8C0A-E6DD477D7985}" dt="2025-04-06T23:24:59.942" v="186"/>
+          <ac:picMkLst>
+            <pc:docMk/>
+            <pc:sldMk cId="1703094016" sldId="257"/>
+            <ac:picMk id="2" creationId="{289E6D30-48D1-7FE9-6FE8-B131C5A81906}"/>
+          </ac:picMkLst>
+        </pc:picChg>
+        <pc:picChg chg="add del mod">
+          <ac:chgData name="Ash Stek" userId="0c591091f072a45f" providerId="LiveId" clId="{628F5A35-D314-417A-8C0A-E6DD477D7985}" dt="2025-04-06T23:26:30.222" v="206"/>
+          <ac:picMkLst>
+            <pc:docMk/>
+            <pc:sldMk cId="1703094016" sldId="257"/>
+            <ac:picMk id="2" creationId="{527807E4-D597-2934-95BB-A25A31EF8CD1}"/>
+          </ac:picMkLst>
+        </pc:picChg>
         <pc:picChg chg="add del mod">
           <ac:chgData name="Ash Stek" userId="0c591091f072a45f" providerId="LiveId" clId="{628F5A35-D314-417A-8C0A-E6DD477D7985}" dt="2025-04-06T04:14:08.219" v="9"/>
           <ac:picMkLst>
@@ -256,11 +351,27 @@
           </ac:picMkLst>
         </pc:picChg>
         <pc:picChg chg="add del mod">
+          <ac:chgData name="Ash Stek" userId="0c591091f072a45f" providerId="LiveId" clId="{628F5A35-D314-417A-8C0A-E6DD477D7985}" dt="2025-04-06T22:24:34.208" v="138"/>
+          <ac:picMkLst>
+            <pc:docMk/>
+            <pc:sldMk cId="1703094016" sldId="257"/>
+            <ac:picMk id="3" creationId="{298796EF-CFF7-B950-D6FE-5EABDAC0A267}"/>
+          </ac:picMkLst>
+        </pc:picChg>
+        <pc:picChg chg="add del mod">
           <ac:chgData name="Ash Stek" userId="0c591091f072a45f" providerId="LiveId" clId="{628F5A35-D314-417A-8C0A-E6DD477D7985}" dt="2025-04-06T04:31:51.826" v="21"/>
           <ac:picMkLst>
             <pc:docMk/>
             <pc:sldMk cId="1703094016" sldId="257"/>
             <ac:picMk id="3" creationId="{37659A39-6D41-1AAF-9E91-A606D3C70685}"/>
+          </ac:picMkLst>
+        </pc:picChg>
+        <pc:picChg chg="add mod">
+          <ac:chgData name="Ash Stek" userId="0c591091f072a45f" providerId="LiveId" clId="{628F5A35-D314-417A-8C0A-E6DD477D7985}" dt="2025-04-06T23:26:30.517" v="212"/>
+          <ac:picMkLst>
+            <pc:docMk/>
+            <pc:sldMk cId="1703094016" sldId="257"/>
+            <ac:picMk id="3" creationId="{4A10746C-B022-8FD4-ADA8-57E1F765830B}"/>
           </ac:picMkLst>
         </pc:picChg>
         <pc:picChg chg="add del mod">
@@ -269,6 +380,22 @@
             <pc:docMk/>
             <pc:sldMk cId="1703094016" sldId="257"/>
             <ac:picMk id="3" creationId="{9671F07E-1C8E-A215-FF06-390CE2940904}"/>
+          </ac:picMkLst>
+        </pc:picChg>
+        <pc:picChg chg="add del mod">
+          <ac:chgData name="Ash Stek" userId="0c591091f072a45f" providerId="LiveId" clId="{628F5A35-D314-417A-8C0A-E6DD477D7985}" dt="2025-04-06T23:25:48.172" v="196"/>
+          <ac:picMkLst>
+            <pc:docMk/>
+            <pc:sldMk cId="1703094016" sldId="257"/>
+            <ac:picMk id="3" creationId="{A1434621-3805-4217-4FA3-183AEB6D3F78}"/>
+          </ac:picMkLst>
+        </pc:picChg>
+        <pc:picChg chg="add del mod">
+          <ac:chgData name="Ash Stek" userId="0c591091f072a45f" providerId="LiveId" clId="{628F5A35-D314-417A-8C0A-E6DD477D7985}" dt="2025-04-06T22:26:07.838" v="150"/>
+          <ac:picMkLst>
+            <pc:docMk/>
+            <pc:sldMk cId="1703094016" sldId="257"/>
+            <ac:picMk id="4" creationId="{BFCFB3AE-7F7E-AF37-16F7-3A76420C793A}"/>
           </ac:picMkLst>
         </pc:picChg>
         <pc:picChg chg="add del mod">
@@ -287,8 +414,8 @@
             <ac:picMk id="4" creationId="{D8B25D1B-AE9E-BD51-709C-309A51AB7DA2}"/>
           </ac:picMkLst>
         </pc:picChg>
-        <pc:picChg chg="add mod">
-          <ac:chgData name="Ash Stek" userId="0c591091f072a45f" providerId="LiveId" clId="{628F5A35-D314-417A-8C0A-E6DD477D7985}" dt="2025-04-06T15:23:01.046" v="108"/>
+        <pc:picChg chg="add del mod">
+          <ac:chgData name="Ash Stek" userId="0c591091f072a45f" providerId="LiveId" clId="{628F5A35-D314-417A-8C0A-E6DD477D7985}" dt="2025-04-06T22:24:07.886" v="114"/>
           <ac:picMkLst>
             <pc:docMk/>
             <pc:sldMk cId="1703094016" sldId="257"/>
@@ -304,6 +431,14 @@
           </ac:picMkLst>
         </pc:picChg>
         <pc:picChg chg="add del mod">
+          <ac:chgData name="Ash Stek" userId="0c591091f072a45f" providerId="LiveId" clId="{628F5A35-D314-417A-8C0A-E6DD477D7985}" dt="2025-04-06T22:26:14.604" v="162"/>
+          <ac:picMkLst>
+            <pc:docMk/>
+            <pc:sldMk cId="1703094016" sldId="257"/>
+            <ac:picMk id="7" creationId="{A8062758-35EC-8295-B5FE-D819796A1D99}"/>
+          </ac:picMkLst>
+        </pc:picChg>
+        <pc:picChg chg="add del mod">
           <ac:chgData name="Ash Stek" userId="0c591091f072a45f" providerId="LiveId" clId="{628F5A35-D314-417A-8C0A-E6DD477D7985}" dt="2025-04-06T15:00:16.819" v="54"/>
           <ac:picMkLst>
             <pc:docMk/>
@@ -311,19 +446,43 @@
             <ac:picMk id="7" creationId="{C8895213-526B-F8B7-663C-CCBBB34F7229}"/>
           </ac:picMkLst>
         </pc:picChg>
+        <pc:picChg chg="add del mod">
+          <ac:chgData name="Ash Stek" userId="0c591091f072a45f" providerId="LiveId" clId="{628F5A35-D314-417A-8C0A-E6DD477D7985}" dt="2025-04-06T23:23:43.967" v="174"/>
+          <ac:picMkLst>
+            <pc:docMk/>
+            <pc:sldMk cId="1703094016" sldId="257"/>
+            <ac:picMk id="8" creationId="{EEEF7086-925E-E94B-E855-F45AEEF4E9D3}"/>
+          </ac:picMkLst>
+        </pc:picChg>
       </pc:sldChg>
       <pc:sldChg chg="addSp delSp modSp mod">
-        <pc:chgData name="Ash Stek" userId="0c591091f072a45f" providerId="LiveId" clId="{628F5A35-D314-417A-8C0A-E6DD477D7985}" dt="2025-04-06T15:23:01.081" v="110"/>
+        <pc:chgData name="Ash Stek" userId="0c591091f072a45f" providerId="LiveId" clId="{628F5A35-D314-417A-8C0A-E6DD477D7985}" dt="2025-04-06T23:26:30.593" v="214"/>
         <pc:sldMkLst>
           <pc:docMk/>
           <pc:sldMk cId="3037202635" sldId="258"/>
         </pc:sldMkLst>
+        <pc:picChg chg="add del mod">
+          <ac:chgData name="Ash Stek" userId="0c591091f072a45f" providerId="LiveId" clId="{628F5A35-D314-417A-8C0A-E6DD477D7985}" dt="2025-04-06T23:24:59.955" v="188"/>
+          <ac:picMkLst>
+            <pc:docMk/>
+            <pc:sldMk cId="3037202635" sldId="258"/>
+            <ac:picMk id="2" creationId="{579239FD-A9B1-DB4F-86DF-38CEA7FB3999}"/>
+          </ac:picMkLst>
+        </pc:picChg>
         <pc:picChg chg="add del mod">
           <ac:chgData name="Ash Stek" userId="0c591091f072a45f" providerId="LiveId" clId="{628F5A35-D314-417A-8C0A-E6DD477D7985}" dt="2025-04-06T15:01:09.187" v="68"/>
           <ac:picMkLst>
             <pc:docMk/>
             <pc:sldMk cId="3037202635" sldId="258"/>
             <ac:picMk id="2" creationId="{8F269233-AF35-50F5-BBA2-8039CD59534F}"/>
+          </ac:picMkLst>
+        </pc:picChg>
+        <pc:picChg chg="add del mod">
+          <ac:chgData name="Ash Stek" userId="0c591091f072a45f" providerId="LiveId" clId="{628F5A35-D314-417A-8C0A-E6DD477D7985}" dt="2025-04-06T23:26:30.238" v="208"/>
+          <ac:picMkLst>
+            <pc:docMk/>
+            <pc:sldMk cId="3037202635" sldId="258"/>
+            <ac:picMk id="2" creationId="{93788DC4-6D97-05B3-4394-F21E76925784}"/>
           </ac:picMkLst>
         </pc:picChg>
         <pc:picChg chg="add del mod">
@@ -335,11 +494,27 @@
           </ac:picMkLst>
         </pc:picChg>
         <pc:picChg chg="add del mod">
+          <ac:chgData name="Ash Stek" userId="0c591091f072a45f" providerId="LiveId" clId="{628F5A35-D314-417A-8C0A-E6DD477D7985}" dt="2025-04-06T22:24:21.580" v="128"/>
+          <ac:picMkLst>
+            <pc:docMk/>
+            <pc:sldMk cId="3037202635" sldId="258"/>
+            <ac:picMk id="2" creationId="{A83E82B0-4B00-6EA5-4724-0575A9C62A16}"/>
+          </ac:picMkLst>
+        </pc:picChg>
+        <pc:picChg chg="add del mod">
           <ac:chgData name="Ash Stek" userId="0c591091f072a45f" providerId="LiveId" clId="{628F5A35-D314-417A-8C0A-E6DD477D7985}" dt="2025-04-06T04:14:08.229" v="11"/>
           <ac:picMkLst>
             <pc:docMk/>
             <pc:sldMk cId="3037202635" sldId="258"/>
             <ac:picMk id="2" creationId="{D871E2D4-671F-1ED4-54F0-6536DFDB9547}"/>
+          </ac:picMkLst>
+        </pc:picChg>
+        <pc:picChg chg="add mod">
+          <ac:chgData name="Ash Stek" userId="0c591091f072a45f" providerId="LiveId" clId="{628F5A35-D314-417A-8C0A-E6DD477D7985}" dt="2025-04-06T23:26:30.593" v="214"/>
+          <ac:picMkLst>
+            <pc:docMk/>
+            <pc:sldMk cId="3037202635" sldId="258"/>
+            <ac:picMk id="3" creationId="{3D282692-0DDA-C6A5-3289-D23D40DC22A5}"/>
           </ac:picMkLst>
         </pc:picChg>
         <pc:picChg chg="add del mod">
@@ -359,6 +534,14 @@
           </ac:picMkLst>
         </pc:picChg>
         <pc:picChg chg="add del mod">
+          <ac:chgData name="Ash Stek" userId="0c591091f072a45f" providerId="LiveId" clId="{628F5A35-D314-417A-8C0A-E6DD477D7985}" dt="2025-04-06T22:24:34.220" v="140"/>
+          <ac:picMkLst>
+            <pc:docMk/>
+            <pc:sldMk cId="3037202635" sldId="258"/>
+            <ac:picMk id="3" creationId="{D09E162F-CF25-15F1-EB81-F562486E7EA5}"/>
+          </ac:picMkLst>
+        </pc:picChg>
+        <pc:picChg chg="add del mod">
           <ac:chgData name="Ash Stek" userId="0c591091f072a45f" providerId="LiveId" clId="{628F5A35-D314-417A-8C0A-E6DD477D7985}" dt="2025-04-06T10:36:00.089" v="32" actId="478"/>
           <ac:picMkLst>
             <pc:docMk/>
@@ -374,8 +557,16 @@
             <ac:picMk id="4" creationId="{7887FDDB-F056-DD9A-C6F1-94263876AEDB}"/>
           </ac:picMkLst>
         </pc:picChg>
-        <pc:picChg chg="add mod">
-          <ac:chgData name="Ash Stek" userId="0c591091f072a45f" providerId="LiveId" clId="{628F5A35-D314-417A-8C0A-E6DD477D7985}" dt="2025-04-06T15:23:01.081" v="110"/>
+        <pc:picChg chg="add del mod">
+          <ac:chgData name="Ash Stek" userId="0c591091f072a45f" providerId="LiveId" clId="{628F5A35-D314-417A-8C0A-E6DD477D7985}" dt="2025-04-06T22:26:07.848" v="152"/>
+          <ac:picMkLst>
+            <pc:docMk/>
+            <pc:sldMk cId="3037202635" sldId="258"/>
+            <ac:picMk id="4" creationId="{C10E4EAB-AF24-39D9-E01F-5AB799505936}"/>
+          </ac:picMkLst>
+        </pc:picChg>
+        <pc:picChg chg="add del mod">
+          <ac:chgData name="Ash Stek" userId="0c591091f072a45f" providerId="LiveId" clId="{628F5A35-D314-417A-8C0A-E6DD477D7985}" dt="2025-04-06T22:24:07.898" v="116"/>
           <ac:picMkLst>
             <pc:docMk/>
             <pc:sldMk cId="3037202635" sldId="258"/>
@@ -396,6 +587,22 @@
             <pc:docMk/>
             <pc:sldMk cId="3037202635" sldId="258"/>
             <ac:picMk id="7" creationId="{65765802-C85E-3503-C85A-B4343326392B}"/>
+          </ac:picMkLst>
+        </pc:picChg>
+        <pc:picChg chg="add del mod">
+          <ac:chgData name="Ash Stek" userId="0c591091f072a45f" providerId="LiveId" clId="{628F5A35-D314-417A-8C0A-E6DD477D7985}" dt="2025-04-06T22:26:14.614" v="164"/>
+          <ac:picMkLst>
+            <pc:docMk/>
+            <pc:sldMk cId="3037202635" sldId="258"/>
+            <ac:picMk id="7" creationId="{A68834A9-9D0F-4AA6-D48C-4813ADA10A9F}"/>
+          </ac:picMkLst>
+        </pc:picChg>
+        <pc:picChg chg="add del mod">
+          <ac:chgData name="Ash Stek" userId="0c591091f072a45f" providerId="LiveId" clId="{628F5A35-D314-417A-8C0A-E6DD477D7985}" dt="2025-04-06T23:23:43.979" v="176"/>
+          <ac:picMkLst>
+            <pc:docMk/>
+            <pc:sldMk cId="3037202635" sldId="258"/>
+            <ac:picMk id="8" creationId="{61AD9264-46A9-95A4-976F-68281D4C8E75}"/>
           </ac:picMkLst>
         </pc:picChg>
       </pc:sldChg>
@@ -4255,10 +4462,10 @@
       </p:pic>
       <p:pic>
         <p:nvPicPr>
-          <p:cNvPr id="5" name="PPHBoard">
-            <a:extLst>
-              <a:ext uri="{FF2B5EF4-FFF2-40B4-BE49-F238E27FC236}">
-                <a16:creationId xmlns:a16="http://schemas.microsoft.com/office/drawing/2014/main" id="{601BA351-3A08-31C3-E3E2-2FAA4D63D27E}"/>
+          <p:cNvPr id="3" name="PPHBoard">
+            <a:extLst>
+              <a:ext uri="{FF2B5EF4-FFF2-40B4-BE49-F238E27FC236}">
+                <a16:creationId xmlns:a16="http://schemas.microsoft.com/office/drawing/2014/main" id="{D4A9120E-DDDE-FC9A-40C0-B889788C255C}"/>
               </a:ext>
             </a:extLst>
           </p:cNvPr>
@@ -4351,10 +4558,10 @@
       </p:pic>
       <p:pic>
         <p:nvPicPr>
-          <p:cNvPr id="5" name="PPHBoard">
-            <a:extLst>
-              <a:ext uri="{FF2B5EF4-FFF2-40B4-BE49-F238E27FC236}">
-                <a16:creationId xmlns:a16="http://schemas.microsoft.com/office/drawing/2014/main" id="{7C2FDB66-7F9F-BF8B-5F29-0B27548F4EEB}"/>
+          <p:cNvPr id="3" name="PPHBoard">
+            <a:extLst>
+              <a:ext uri="{FF2B5EF4-FFF2-40B4-BE49-F238E27FC236}">
+                <a16:creationId xmlns:a16="http://schemas.microsoft.com/office/drawing/2014/main" id="{4A10746C-B022-8FD4-ADA8-57E1F765830B}"/>
               </a:ext>
             </a:extLst>
           </p:cNvPr>
@@ -4447,10 +4654,10 @@
       </p:pic>
       <p:pic>
         <p:nvPicPr>
-          <p:cNvPr id="5" name="PPHBoard">
-            <a:extLst>
-              <a:ext uri="{FF2B5EF4-FFF2-40B4-BE49-F238E27FC236}">
-                <a16:creationId xmlns:a16="http://schemas.microsoft.com/office/drawing/2014/main" id="{7CFC1014-7D2A-6464-3648-81068943030E}"/>
+          <p:cNvPr id="3" name="PPHBoard">
+            <a:extLst>
+              <a:ext uri="{FF2B5EF4-FFF2-40B4-BE49-F238E27FC236}">
+                <a16:creationId xmlns:a16="http://schemas.microsoft.com/office/drawing/2014/main" id="{3D282692-0DDA-C6A5-3289-D23D40DC22A5}"/>
               </a:ext>
             </a:extLst>
           </p:cNvPr>

</xml_diff>